<commit_message>
Add dns pod kill enhancement to doc
</commit_message>
<xml_diff>
--- a/doc/podsupervisor.pptx
+++ b/doc/podsupervisor.pptx
@@ -3485,8 +3485,8 @@
           <a:p>
             <a:pPr algn="r"/>
             <a:r>
-              <a:rPr lang="en-US"/>
-              <a:t>Sep 27, 2022</a:t>
+              <a:rPr lang="en-US" dirty="0"/>
+              <a:t>Sep 27, 2022 17:28</a:t>
             </a:r>
           </a:p>
         </p:txBody>
@@ -3913,55 +3913,41 @@
               <a:t>-” in there namespace/project name.</a:t>
             </a:r>
           </a:p>
+          <a:p>
+            <a:r>
+              <a:rPr lang="en-US" dirty="0"/>
+              <a:t>DNS Pod on malfunctioning node is deleted and allowed to reschedule.</a:t>
+            </a:r>
+          </a:p>
         </p:txBody>
       </p:sp>
       <p:pic>
         <p:nvPicPr>
-          <p:cNvPr id="2052" name="Picture 4">
-            <a:extLst>
-              <a:ext uri="{FF2B5EF4-FFF2-40B4-BE49-F238E27FC236}">
-                <a16:creationId xmlns:a16="http://schemas.microsoft.com/office/drawing/2014/main" id="{883E90FA-B761-D06C-7E50-C5CAF3AF892A}"/>
+          <p:cNvPr id="6" name="Content Placeholder 5">
+            <a:extLst>
+              <a:ext uri="{FF2B5EF4-FFF2-40B4-BE49-F238E27FC236}">
+                <a16:creationId xmlns:a16="http://schemas.microsoft.com/office/drawing/2014/main" id="{7504DB5F-150C-06FE-21B3-947D0E897462}"/>
               </a:ext>
             </a:extLst>
           </p:cNvPr>
           <p:cNvPicPr>
-            <a:picLocks noGrp="1" noChangeAspect="1" noChangeArrowheads="1"/>
+            <a:picLocks noGrp="1" noChangeAspect="1"/>
           </p:cNvPicPr>
           <p:nvPr>
             <p:ph sz="half" idx="2"/>
           </p:nvPr>
         </p:nvPicPr>
         <p:blipFill>
-          <a:blip r:embed="rId2">
-            <a:extLst>
-              <a:ext uri="{28A0092B-C50C-407E-A947-70E740481C1C}">
-                <a14:useLocalDpi xmlns:a14="http://schemas.microsoft.com/office/drawing/2010/main" val="0"/>
-              </a:ext>
-            </a:extLst>
-          </a:blip>
-          <a:srcRect/>
+          <a:blip r:embed="rId2"/>
           <a:stretch>
             <a:fillRect/>
           </a:stretch>
         </p:blipFill>
-        <p:spPr bwMode="auto">
+        <p:spPr>
           <a:xfrm>
-            <a:off x="6096000" y="1690688"/>
-            <a:ext cx="5181600" cy="3882498"/>
+            <a:off x="6172200" y="2932693"/>
+            <a:ext cx="5181600" cy="2137201"/>
           </a:xfrm>
-          <a:prstGeom prst="rect">
-            <a:avLst/>
-          </a:prstGeom>
-          <a:noFill/>
-          <a:extLst>
-            <a:ext uri="{909E8E84-426E-40DD-AFC4-6F175D3DCCD1}">
-              <a14:hiddenFill xmlns:a14="http://schemas.microsoft.com/office/drawing/2010/main">
-                <a:solidFill>
-                  <a:srgbClr val="FFFFFF"/>
-                </a:solidFill>
-              </a14:hiddenFill>
-            </a:ext>
-          </a:extLst>
         </p:spPr>
       </p:pic>
     </p:spTree>
@@ -4339,20 +4325,6 @@
             <a:r>
               <a:rPr lang="en-US" dirty="0"/>
               <a:t>Event/Notification/Logging</a:t>
-            </a:r>
-          </a:p>
-          <a:p>
-            <a:r>
-              <a:rPr lang="en-US" dirty="0"/>
-              <a:t>Kill </a:t>
-            </a:r>
-            <a:r>
-              <a:rPr lang="en-US" dirty="0" err="1"/>
-              <a:t>coredns</a:t>
-            </a:r>
-            <a:r>
-              <a:rPr lang="en-US" dirty="0"/>
-              <a:t> service if exists </a:t>
             </a:r>
           </a:p>
           <a:p>

</xml_diff>

<commit_message>
Add alerting, and node flapping detection
</commit_message>
<xml_diff>
--- a/doc/podsupervisor.pptx
+++ b/doc/podsupervisor.pptx
@@ -8,10 +8,11 @@
     <p:sldId id="256" r:id="rId2"/>
     <p:sldId id="257" r:id="rId3"/>
     <p:sldId id="258" r:id="rId4"/>
-    <p:sldId id="259" r:id="rId5"/>
-    <p:sldId id="260" r:id="rId6"/>
-    <p:sldId id="262" r:id="rId7"/>
-    <p:sldId id="261" r:id="rId8"/>
+    <p:sldId id="263" r:id="rId5"/>
+    <p:sldId id="259" r:id="rId6"/>
+    <p:sldId id="260" r:id="rId7"/>
+    <p:sldId id="262" r:id="rId8"/>
+    <p:sldId id="261" r:id="rId9"/>
   </p:sldIdLst>
   <p:sldSz cx="12192000" cy="6858000"/>
   <p:notesSz cx="6858000" cy="9144000"/>
@@ -3985,6 +3986,192 @@
           <p:cNvPr id="2" name="Title 1">
             <a:extLst>
               <a:ext uri="{FF2B5EF4-FFF2-40B4-BE49-F238E27FC236}">
+                <a16:creationId xmlns:a16="http://schemas.microsoft.com/office/drawing/2014/main" id="{28890D35-B3FB-600F-4E9A-2D334F3BEBA1}"/>
+              </a:ext>
+            </a:extLst>
+          </p:cNvPr>
+          <p:cNvSpPr>
+            <a:spLocks noGrp="1"/>
+          </p:cNvSpPr>
+          <p:nvPr>
+            <p:ph type="title"/>
+          </p:nvPr>
+        </p:nvSpPr>
+        <p:spPr/>
+        <p:txBody>
+          <a:bodyPr/>
+          <a:lstStyle/>
+          <a:p>
+            <a:r>
+              <a:rPr lang="en-US" dirty="0"/>
+              <a:t>Additional Features</a:t>
+            </a:r>
+          </a:p>
+        </p:txBody>
+      </p:sp>
+      <p:sp>
+        <p:nvSpPr>
+          <p:cNvPr id="3" name="Content Placeholder 2">
+            <a:extLst>
+              <a:ext uri="{FF2B5EF4-FFF2-40B4-BE49-F238E27FC236}">
+                <a16:creationId xmlns:a16="http://schemas.microsoft.com/office/drawing/2014/main" id="{10C102D6-DE45-419B-10FA-3B4D4029B91D}"/>
+              </a:ext>
+            </a:extLst>
+          </p:cNvPr>
+          <p:cNvSpPr>
+            <a:spLocks noGrp="1"/>
+          </p:cNvSpPr>
+          <p:nvPr>
+            <p:ph sz="half" idx="1"/>
+          </p:nvPr>
+        </p:nvSpPr>
+        <p:spPr/>
+        <p:txBody>
+          <a:bodyPr/>
+          <a:lstStyle/>
+          <a:p>
+            <a:r>
+              <a:rPr lang="en-US" dirty="0"/>
+              <a:t>Node flapping detection </a:t>
+            </a:r>
+          </a:p>
+          <a:p>
+            <a:pPr lvl="1"/>
+            <a:r>
+              <a:rPr lang="en-US" dirty="0"/>
+              <a:t>Node must be not ready two scans</a:t>
+            </a:r>
+          </a:p>
+          <a:p>
+            <a:r>
+              <a:rPr lang="en-US" dirty="0"/>
+              <a:t>On </a:t>
+            </a:r>
+            <a:r>
+              <a:rPr lang="en-US"/>
+              <a:t>pod deletion, </a:t>
+            </a:r>
+            <a:r>
+              <a:rPr lang="en-US" dirty="0"/>
+              <a:t>alerts are sent to OpenShift Alert Manager.</a:t>
+            </a:r>
+          </a:p>
+        </p:txBody>
+      </p:sp>
+      <p:pic>
+        <p:nvPicPr>
+          <p:cNvPr id="6" name="Content Placeholder 5">
+            <a:extLst>
+              <a:ext uri="{FF2B5EF4-FFF2-40B4-BE49-F238E27FC236}">
+                <a16:creationId xmlns:a16="http://schemas.microsoft.com/office/drawing/2014/main" id="{AC0CDC8A-C1FE-1EA7-8483-5A795CE6D401}"/>
+              </a:ext>
+            </a:extLst>
+          </p:cNvPr>
+          <p:cNvPicPr>
+            <a:picLocks noGrp="1" noChangeAspect="1"/>
+          </p:cNvPicPr>
+          <p:nvPr>
+            <p:ph sz="half" idx="2"/>
+          </p:nvPr>
+        </p:nvPicPr>
+        <p:blipFill>
+          <a:blip r:embed="rId2"/>
+          <a:stretch>
+            <a:fillRect/>
+          </a:stretch>
+        </p:blipFill>
+        <p:spPr>
+          <a:xfrm>
+            <a:off x="7237627" y="1593786"/>
+            <a:ext cx="3149600" cy="2590800"/>
+          </a:xfrm>
+          <a:prstGeom prst="rect">
+            <a:avLst/>
+          </a:prstGeom>
+        </p:spPr>
+      </p:pic>
+      <p:pic>
+        <p:nvPicPr>
+          <p:cNvPr id="3076" name="Picture 4" descr="Notification Alarm Buzzer icon PNG and SVG Vector Free Download">
+            <a:extLst>
+              <a:ext uri="{FF2B5EF4-FFF2-40B4-BE49-F238E27FC236}">
+                <a16:creationId xmlns:a16="http://schemas.microsoft.com/office/drawing/2014/main" id="{D54EAC7C-0773-656D-F570-29DFF0EA7372}"/>
+              </a:ext>
+            </a:extLst>
+          </p:cNvPr>
+          <p:cNvPicPr>
+            <a:picLocks noChangeAspect="1" noChangeArrowheads="1"/>
+          </p:cNvPicPr>
+          <p:nvPr/>
+        </p:nvPicPr>
+        <p:blipFill>
+          <a:blip r:embed="rId3">
+            <a:extLst>
+              <a:ext uri="{28A0092B-C50C-407E-A947-70E740481C1C}">
+                <a14:useLocalDpi xmlns:a14="http://schemas.microsoft.com/office/drawing/2010/main" val="0"/>
+              </a:ext>
+            </a:extLst>
+          </a:blip>
+          <a:srcRect/>
+          <a:stretch>
+            <a:fillRect/>
+          </a:stretch>
+        </p:blipFill>
+        <p:spPr bwMode="auto">
+          <a:xfrm>
+            <a:off x="7751977" y="4322462"/>
+            <a:ext cx="2120900" cy="1549400"/>
+          </a:xfrm>
+          <a:prstGeom prst="rect">
+            <a:avLst/>
+          </a:prstGeom>
+          <a:noFill/>
+          <a:extLst>
+            <a:ext uri="{909E8E84-426E-40DD-AFC4-6F175D3DCCD1}">
+              <a14:hiddenFill xmlns:a14="http://schemas.microsoft.com/office/drawing/2010/main">
+                <a:solidFill>
+                  <a:srgbClr val="FFFFFF"/>
+                </a:solidFill>
+              </a14:hiddenFill>
+            </a:ext>
+          </a:extLst>
+        </p:spPr>
+      </p:pic>
+    </p:spTree>
+    <p:extLst>
+      <p:ext uri="{BB962C8B-B14F-4D97-AF65-F5344CB8AC3E}">
+        <p14:creationId xmlns:p14="http://schemas.microsoft.com/office/powerpoint/2010/main" val="2314301527"/>
+      </p:ext>
+    </p:extLst>
+  </p:cSld>
+  <p:clrMapOvr>
+    <a:masterClrMapping/>
+  </p:clrMapOvr>
+</p:sld>
+</file>
+
+<file path=ppt/slides/slide5.xml><?xml version="1.0" encoding="utf-8"?>
+<p:sld xmlns:a="http://schemas.openxmlformats.org/drawingml/2006/main" xmlns:r="http://schemas.openxmlformats.org/officeDocument/2006/relationships" xmlns:p="http://schemas.openxmlformats.org/presentationml/2006/main">
+  <p:cSld>
+    <p:spTree>
+      <p:nvGrpSpPr>
+        <p:cNvPr id="1" name=""/>
+        <p:cNvGrpSpPr/>
+        <p:nvPr/>
+      </p:nvGrpSpPr>
+      <p:grpSpPr>
+        <a:xfrm>
+          <a:off x="0" y="0"/>
+          <a:ext cx="0" cy="0"/>
+          <a:chOff x="0" y="0"/>
+          <a:chExt cx="0" cy="0"/>
+        </a:xfrm>
+      </p:grpSpPr>
+      <p:sp>
+        <p:nvSpPr>
+          <p:cNvPr id="2" name="Title 1">
+            <a:extLst>
+              <a:ext uri="{FF2B5EF4-FFF2-40B4-BE49-F238E27FC236}">
                 <a16:creationId xmlns:a16="http://schemas.microsoft.com/office/drawing/2014/main" id="{7735D7C0-8E5B-AB5C-06FB-682A907916BC}"/>
               </a:ext>
             </a:extLst>
@@ -4098,7 +4285,7 @@
 </p:sld>
 </file>
 
-<file path=ppt/slides/slide5.xml><?xml version="1.0" encoding="utf-8"?>
+<file path=ppt/slides/slide6.xml><?xml version="1.0" encoding="utf-8"?>
 <p:sld xmlns:a="http://schemas.openxmlformats.org/drawingml/2006/main" xmlns:r="http://schemas.openxmlformats.org/officeDocument/2006/relationships" xmlns:p="http://schemas.openxmlformats.org/presentationml/2006/main">
   <p:cSld>
     <p:spTree>
@@ -4240,7 +4427,7 @@
 </p:sld>
 </file>
 
-<file path=ppt/slides/slide6.xml><?xml version="1.0" encoding="utf-8"?>
+<file path=ppt/slides/slide7.xml><?xml version="1.0" encoding="utf-8"?>
 <p:sld xmlns:a="http://schemas.openxmlformats.org/drawingml/2006/main" xmlns:r="http://schemas.openxmlformats.org/officeDocument/2006/relationships" xmlns:p="http://schemas.openxmlformats.org/presentationml/2006/main">
   <p:cSld>
     <p:spTree>
@@ -4360,7 +4547,7 @@
 </p:sld>
 </file>
 
-<file path=ppt/slides/slide7.xml><?xml version="1.0" encoding="utf-8"?>
+<file path=ppt/slides/slide8.xml><?xml version="1.0" encoding="utf-8"?>
 <p:sld xmlns:a="http://schemas.openxmlformats.org/drawingml/2006/main" xmlns:r="http://schemas.openxmlformats.org/officeDocument/2006/relationships" xmlns:p="http://schemas.openxmlformats.org/presentationml/2006/main">
   <p:cSld>
     <p:spTree>

</xml_diff>